<commit_message>
Added a new design slide
</commit_message>
<xml_diff>
--- a/Breakfast Manager.pptx
+++ b/Breakfast Manager.pptx
@@ -11,10 +11,11 @@
     <p:sldId id="258" r:id="rId5"/>
     <p:sldId id="264" r:id="rId6"/>
     <p:sldId id="259" r:id="rId7"/>
-    <p:sldId id="263" r:id="rId8"/>
-    <p:sldId id="262" r:id="rId9"/>
-    <p:sldId id="261" r:id="rId10"/>
-    <p:sldId id="265" r:id="rId11"/>
+    <p:sldId id="266" r:id="rId8"/>
+    <p:sldId id="263" r:id="rId9"/>
+    <p:sldId id="262" r:id="rId10"/>
+    <p:sldId id="261" r:id="rId11"/>
+    <p:sldId id="265" r:id="rId12"/>
   </p:sldIdLst>
   <p:sldSz cx="12192000" cy="6858000"/>
   <p:notesSz cx="6858000" cy="9144000"/>
@@ -113,6 +114,11 @@
       </a:defRPr>
     </a:lvl9pPr>
   </p:defaultTextStyle>
+  <p:extLst>
+    <p:ext uri="{EFAFB233-063F-42B5-8137-9DF3F51BA10A}">
+      <p15:sldGuideLst xmlns:p15="http://schemas.microsoft.com/office/powerpoint/2012/main"/>
+    </p:ext>
+  </p:extLst>
 </p:presentation>
 </file>
 
@@ -403,7 +409,7 @@
           <a:p>
             <a:fld id="{027C2AD8-6BF6-4F86-AAE2-DFD1AFBAAC7B}" type="datetimeFigureOut">
               <a:rPr lang="da-DK" smtClean="0"/>
-              <a:t>20-06-2016</a:t>
+              <a:t>22-06-2016</a:t>
             </a:fld>
             <a:endParaRPr lang="da-DK"/>
           </a:p>
@@ -445,7 +451,7 @@
           <a:p>
             <a:fld id="{0EE83DE2-9CA6-4DC1-99E6-45D4945845F8}" type="slidenum">
               <a:rPr lang="da-DK" smtClean="0"/>
-              <a:t>‹nr.›</a:t>
+              <a:t>‹#›</a:t>
             </a:fld>
             <a:endParaRPr lang="da-DK"/>
           </a:p>
@@ -721,7 +727,7 @@
           <a:p>
             <a:fld id="{027C2AD8-6BF6-4F86-AAE2-DFD1AFBAAC7B}" type="datetimeFigureOut">
               <a:rPr lang="da-DK" smtClean="0"/>
-              <a:t>20-06-2016</a:t>
+              <a:t>22-06-2016</a:t>
             </a:fld>
             <a:endParaRPr lang="da-DK"/>
           </a:p>
@@ -763,7 +769,7 @@
           <a:p>
             <a:fld id="{0EE83DE2-9CA6-4DC1-99E6-45D4945845F8}" type="slidenum">
               <a:rPr lang="da-DK" smtClean="0"/>
-              <a:t>‹nr.›</a:t>
+              <a:t>‹#›</a:t>
             </a:fld>
             <a:endParaRPr lang="da-DK"/>
           </a:p>
@@ -1209,7 +1215,7 @@
           <a:p>
             <a:fld id="{027C2AD8-6BF6-4F86-AAE2-DFD1AFBAAC7B}" type="datetimeFigureOut">
               <a:rPr lang="da-DK" smtClean="0"/>
-              <a:t>20-06-2016</a:t>
+              <a:t>22-06-2016</a:t>
             </a:fld>
             <a:endParaRPr lang="da-DK"/>
           </a:p>
@@ -1251,7 +1257,7 @@
           <a:p>
             <a:fld id="{0EE83DE2-9CA6-4DC1-99E6-45D4945845F8}" type="slidenum">
               <a:rPr lang="da-DK" smtClean="0"/>
-              <a:t>‹nr.›</a:t>
+              <a:t>‹#›</a:t>
             </a:fld>
             <a:endParaRPr lang="da-DK"/>
           </a:p>
@@ -1578,7 +1584,7 @@
           <a:p>
             <a:fld id="{027C2AD8-6BF6-4F86-AAE2-DFD1AFBAAC7B}" type="datetimeFigureOut">
               <a:rPr lang="da-DK" smtClean="0"/>
-              <a:t>20-06-2016</a:t>
+              <a:t>22-06-2016</a:t>
             </a:fld>
             <a:endParaRPr lang="da-DK"/>
           </a:p>
@@ -1620,7 +1626,7 @@
           <a:p>
             <a:fld id="{0EE83DE2-9CA6-4DC1-99E6-45D4945845F8}" type="slidenum">
               <a:rPr lang="da-DK" smtClean="0"/>
-              <a:t>‹nr.›</a:t>
+              <a:t>‹#›</a:t>
             </a:fld>
             <a:endParaRPr lang="da-DK"/>
           </a:p>
@@ -1851,7 +1857,7 @@
           <a:p>
             <a:fld id="{027C2AD8-6BF6-4F86-AAE2-DFD1AFBAAC7B}" type="datetimeFigureOut">
               <a:rPr lang="da-DK" smtClean="0"/>
-              <a:t>20-06-2016</a:t>
+              <a:t>22-06-2016</a:t>
             </a:fld>
             <a:endParaRPr lang="da-DK"/>
           </a:p>
@@ -1893,7 +1899,7 @@
           <a:p>
             <a:fld id="{0EE83DE2-9CA6-4DC1-99E6-45D4945845F8}" type="slidenum">
               <a:rPr lang="da-DK" smtClean="0"/>
-              <a:t>‹nr.›</a:t>
+              <a:t>‹#›</a:t>
             </a:fld>
             <a:endParaRPr lang="da-DK"/>
           </a:p>
@@ -2136,7 +2142,7 @@
           <a:p>
             <a:fld id="{027C2AD8-6BF6-4F86-AAE2-DFD1AFBAAC7B}" type="datetimeFigureOut">
               <a:rPr lang="da-DK" smtClean="0"/>
-              <a:t>20-06-2016</a:t>
+              <a:t>22-06-2016</a:t>
             </a:fld>
             <a:endParaRPr lang="da-DK"/>
           </a:p>
@@ -2178,7 +2184,7 @@
           <a:p>
             <a:fld id="{0EE83DE2-9CA6-4DC1-99E6-45D4945845F8}" type="slidenum">
               <a:rPr lang="da-DK" smtClean="0"/>
-              <a:t>‹nr.›</a:t>
+              <a:t>‹#›</a:t>
             </a:fld>
             <a:endParaRPr lang="da-DK"/>
           </a:p>
@@ -2419,7 +2425,7 @@
           <a:p>
             <a:fld id="{027C2AD8-6BF6-4F86-AAE2-DFD1AFBAAC7B}" type="datetimeFigureOut">
               <a:rPr lang="da-DK" smtClean="0"/>
-              <a:t>20-06-2016</a:t>
+              <a:t>22-06-2016</a:t>
             </a:fld>
             <a:endParaRPr lang="da-DK"/>
           </a:p>
@@ -2461,7 +2467,7 @@
           <a:p>
             <a:fld id="{0EE83DE2-9CA6-4DC1-99E6-45D4945845F8}" type="slidenum">
               <a:rPr lang="da-DK" smtClean="0"/>
-              <a:t>‹nr.›</a:t>
+              <a:t>‹#›</a:t>
             </a:fld>
             <a:endParaRPr lang="da-DK"/>
           </a:p>
@@ -2762,7 +2768,7 @@
           <a:p>
             <a:fld id="{027C2AD8-6BF6-4F86-AAE2-DFD1AFBAAC7B}" type="datetimeFigureOut">
               <a:rPr lang="da-DK" smtClean="0"/>
-              <a:t>20-06-2016</a:t>
+              <a:t>22-06-2016</a:t>
             </a:fld>
             <a:endParaRPr lang="da-DK"/>
           </a:p>
@@ -2804,7 +2810,7 @@
           <a:p>
             <a:fld id="{0EE83DE2-9CA6-4DC1-99E6-45D4945845F8}" type="slidenum">
               <a:rPr lang="da-DK" smtClean="0"/>
-              <a:t>‹nr.›</a:t>
+              <a:t>‹#›</a:t>
             </a:fld>
             <a:endParaRPr lang="da-DK"/>
           </a:p>
@@ -3101,7 +3107,7 @@
           <a:p>
             <a:fld id="{027C2AD8-6BF6-4F86-AAE2-DFD1AFBAAC7B}" type="datetimeFigureOut">
               <a:rPr lang="da-DK" smtClean="0"/>
-              <a:t>20-06-2016</a:t>
+              <a:t>22-06-2016</a:t>
             </a:fld>
             <a:endParaRPr lang="da-DK"/>
           </a:p>
@@ -3143,7 +3149,7 @@
           <a:p>
             <a:fld id="{0EE83DE2-9CA6-4DC1-99E6-45D4945845F8}" type="slidenum">
               <a:rPr lang="da-DK" smtClean="0"/>
-              <a:t>‹nr.›</a:t>
+              <a:t>‹#›</a:t>
             </a:fld>
             <a:endParaRPr lang="da-DK"/>
           </a:p>
@@ -3578,7 +3584,7 @@
           <a:p>
             <a:fld id="{027C2AD8-6BF6-4F86-AAE2-DFD1AFBAAC7B}" type="datetimeFigureOut">
               <a:rPr lang="da-DK" smtClean="0"/>
-              <a:t>20-06-2016</a:t>
+              <a:t>22-06-2016</a:t>
             </a:fld>
             <a:endParaRPr lang="da-DK"/>
           </a:p>
@@ -3620,7 +3626,7 @@
           <a:p>
             <a:fld id="{0EE83DE2-9CA6-4DC1-99E6-45D4945845F8}" type="slidenum">
               <a:rPr lang="da-DK" smtClean="0"/>
-              <a:t>‹nr.›</a:t>
+              <a:t>‹#›</a:t>
             </a:fld>
             <a:endParaRPr lang="da-DK"/>
           </a:p>
@@ -3799,7 +3805,7 @@
           <a:p>
             <a:fld id="{027C2AD8-6BF6-4F86-AAE2-DFD1AFBAAC7B}" type="datetimeFigureOut">
               <a:rPr lang="da-DK" smtClean="0"/>
-              <a:t>20-06-2016</a:t>
+              <a:t>22-06-2016</a:t>
             </a:fld>
             <a:endParaRPr lang="da-DK"/>
           </a:p>
@@ -3841,7 +3847,7 @@
           <a:p>
             <a:fld id="{0EE83DE2-9CA6-4DC1-99E6-45D4945845F8}" type="slidenum">
               <a:rPr lang="da-DK" smtClean="0"/>
-              <a:t>‹nr.›</a:t>
+              <a:t>‹#›</a:t>
             </a:fld>
             <a:endParaRPr lang="da-DK"/>
           </a:p>
@@ -3894,7 +3900,7 @@
           <a:p>
             <a:fld id="{027C2AD8-6BF6-4F86-AAE2-DFD1AFBAAC7B}" type="datetimeFigureOut">
               <a:rPr lang="da-DK" smtClean="0"/>
-              <a:t>20-06-2016</a:t>
+              <a:t>22-06-2016</a:t>
             </a:fld>
             <a:endParaRPr lang="da-DK"/>
           </a:p>
@@ -3936,7 +3942,7 @@
           <a:p>
             <a:fld id="{0EE83DE2-9CA6-4DC1-99E6-45D4945845F8}" type="slidenum">
               <a:rPr lang="da-DK" smtClean="0"/>
-              <a:t>‹nr.›</a:t>
+              <a:t>‹#›</a:t>
             </a:fld>
             <a:endParaRPr lang="da-DK"/>
           </a:p>
@@ -4361,7 +4367,7 @@
           <a:p>
             <a:fld id="{027C2AD8-6BF6-4F86-AAE2-DFD1AFBAAC7B}" type="datetimeFigureOut">
               <a:rPr lang="da-DK" smtClean="0"/>
-              <a:t>20-06-2016</a:t>
+              <a:t>22-06-2016</a:t>
             </a:fld>
             <a:endParaRPr lang="da-DK"/>
           </a:p>
@@ -4403,7 +4409,7 @@
           <a:p>
             <a:fld id="{0EE83DE2-9CA6-4DC1-99E6-45D4945845F8}" type="slidenum">
               <a:rPr lang="da-DK" smtClean="0"/>
-              <a:t>‹nr.›</a:t>
+              <a:t>‹#›</a:t>
             </a:fld>
             <a:endParaRPr lang="da-DK"/>
           </a:p>
@@ -4674,7 +4680,7 @@
           <a:p>
             <a:fld id="{027C2AD8-6BF6-4F86-AAE2-DFD1AFBAAC7B}" type="datetimeFigureOut">
               <a:rPr lang="da-DK" smtClean="0"/>
-              <a:t>20-06-2016</a:t>
+              <a:t>22-06-2016</a:t>
             </a:fld>
             <a:endParaRPr lang="da-DK"/>
           </a:p>
@@ -4726,7 +4732,7 @@
           <a:p>
             <a:fld id="{0EE83DE2-9CA6-4DC1-99E6-45D4945845F8}" type="slidenum">
               <a:rPr lang="da-DK" smtClean="0"/>
-              <a:t>‹nr.›</a:t>
+              <a:t>‹#›</a:t>
             </a:fld>
             <a:endParaRPr lang="da-DK"/>
           </a:p>
@@ -4944,7 +4950,7 @@
           <a:p>
             <a:fld id="{027C2AD8-6BF6-4F86-AAE2-DFD1AFBAAC7B}" type="datetimeFigureOut">
               <a:rPr lang="da-DK" smtClean="0"/>
-              <a:t>20-06-2016</a:t>
+              <a:t>22-06-2016</a:t>
             </a:fld>
             <a:endParaRPr lang="da-DK"/>
           </a:p>
@@ -4983,7 +4989,7 @@
           <a:p>
             <a:fld id="{0EE83DE2-9CA6-4DC1-99E6-45D4945845F8}" type="slidenum">
               <a:rPr lang="da-DK" smtClean="0"/>
-              <a:t>‹nr.›</a:t>
+              <a:t>‹#›</a:t>
             </a:fld>
             <a:endParaRPr lang="da-DK"/>
           </a:p>
@@ -5515,6 +5521,153 @@
         </p:nvSpPr>
         <p:spPr/>
         <p:txBody>
+          <a:bodyPr>
+            <a:normAutofit/>
+          </a:bodyPr>
+          <a:lstStyle/>
+          <a:p>
+            <a:r>
+              <a:rPr lang="da-DK" dirty="0" smtClean="0"/>
+              <a:t>Usability test</a:t>
+            </a:r>
+          </a:p>
+          <a:p>
+            <a:pPr lvl="1"/>
+            <a:r>
+              <a:rPr lang="da-DK" dirty="0" smtClean="0"/>
+              <a:t>Bruger feedback</a:t>
+            </a:r>
+          </a:p>
+          <a:p>
+            <a:r>
+              <a:rPr lang="da-DK" dirty="0"/>
+              <a:t>Test af eget </a:t>
+            </a:r>
+            <a:r>
+              <a:rPr lang="da-DK" dirty="0" smtClean="0"/>
+              <a:t>produkt</a:t>
+            </a:r>
+          </a:p>
+          <a:p>
+            <a:pPr lvl="1"/>
+            <a:r>
+              <a:rPr lang="da-DK" dirty="0" smtClean="0"/>
+              <a:t>Drejebogen</a:t>
+            </a:r>
+          </a:p>
+          <a:p>
+            <a:pPr lvl="1"/>
+            <a:r>
+              <a:rPr lang="da-DK" dirty="0" smtClean="0"/>
+              <a:t>Brugerkontakt</a:t>
+            </a:r>
+          </a:p>
+          <a:p>
+            <a:r>
+              <a:rPr lang="da-DK" dirty="0" smtClean="0"/>
+              <a:t>Ingen </a:t>
+            </a:r>
+            <a:r>
+              <a:rPr lang="da-DK" dirty="0"/>
+              <a:t>tidlig </a:t>
+            </a:r>
+            <a:r>
+              <a:rPr lang="da-DK" dirty="0" smtClean="0"/>
+              <a:t>brugerinddragelse</a:t>
+            </a:r>
+          </a:p>
+          <a:p>
+            <a:pPr lvl="1"/>
+            <a:r>
+              <a:rPr lang="da-DK" dirty="0" smtClean="0"/>
+              <a:t>Skitser</a:t>
+            </a:r>
+            <a:r>
+              <a:rPr lang="da-DK" dirty="0"/>
+              <a:t> </a:t>
+            </a:r>
+            <a:r>
+              <a:rPr lang="da-DK" dirty="0" smtClean="0"/>
+              <a:t>og spørgeskemaundersøgelser</a:t>
+            </a:r>
+          </a:p>
+          <a:p>
+            <a:endParaRPr lang="da-DK" dirty="0"/>
+          </a:p>
+        </p:txBody>
+      </p:sp>
+    </p:spTree>
+    <p:extLst>
+      <p:ext uri="{BB962C8B-B14F-4D97-AF65-F5344CB8AC3E}">
+        <p14:creationId xmlns:p14="http://schemas.microsoft.com/office/powerpoint/2010/main" val="4136545028"/>
+      </p:ext>
+    </p:extLst>
+  </p:cSld>
+  <p:clrMapOvr>
+    <a:masterClrMapping/>
+  </p:clrMapOvr>
+  <p:timing>
+    <p:tnLst>
+      <p:par>
+        <p:cTn id="1" dur="indefinite" restart="never" nodeType="tmRoot"/>
+      </p:par>
+    </p:tnLst>
+  </p:timing>
+</p:sld>
+</file>
+
+<file path=ppt/slides/slide11.xml><?xml version="1.0" encoding="utf-8"?>
+<p:sld xmlns:a="http://schemas.openxmlformats.org/drawingml/2006/main" xmlns:r="http://schemas.openxmlformats.org/officeDocument/2006/relationships" xmlns:p="http://schemas.openxmlformats.org/presentationml/2006/main">
+  <p:cSld>
+    <p:spTree>
+      <p:nvGrpSpPr>
+        <p:cNvPr id="1" name=""/>
+        <p:cNvGrpSpPr/>
+        <p:nvPr/>
+      </p:nvGrpSpPr>
+      <p:grpSpPr>
+        <a:xfrm>
+          <a:off x="0" y="0"/>
+          <a:ext cx="0" cy="0"/>
+          <a:chOff x="0" y="0"/>
+          <a:chExt cx="0" cy="0"/>
+        </a:xfrm>
+      </p:grpSpPr>
+      <p:sp>
+        <p:nvSpPr>
+          <p:cNvPr id="2" name="Titel 1"/>
+          <p:cNvSpPr>
+            <a:spLocks noGrp="1"/>
+          </p:cNvSpPr>
+          <p:nvPr>
+            <p:ph type="title"/>
+          </p:nvPr>
+        </p:nvSpPr>
+        <p:spPr/>
+        <p:txBody>
+          <a:bodyPr/>
+          <a:lstStyle/>
+          <a:p>
+            <a:r>
+              <a:rPr lang="da-DK" dirty="0" err="1" smtClean="0"/>
+              <a:t>Reflektion</a:t>
+            </a:r>
+            <a:endParaRPr lang="da-DK" dirty="0"/>
+          </a:p>
+        </p:txBody>
+      </p:sp>
+      <p:sp>
+        <p:nvSpPr>
+          <p:cNvPr id="3" name="Pladsholder til indhold 2"/>
+          <p:cNvSpPr>
+            <a:spLocks noGrp="1"/>
+          </p:cNvSpPr>
+          <p:nvPr>
+            <p:ph idx="1"/>
+          </p:nvPr>
+        </p:nvSpPr>
+        <p:spPr/>
+        <p:txBody>
           <a:bodyPr/>
           <a:lstStyle/>
           <a:p>
@@ -6085,25 +6238,6 @@
           </a:p>
         </p:txBody>
       </p:sp>
-      <p:sp>
-        <p:nvSpPr>
-          <p:cNvPr id="3" name="Pladsholder til indhold 2"/>
-          <p:cNvSpPr>
-            <a:spLocks noGrp="1"/>
-          </p:cNvSpPr>
-          <p:nvPr>
-            <p:ph idx="1"/>
-          </p:nvPr>
-        </p:nvSpPr>
-        <p:spPr/>
-        <p:txBody>
-          <a:bodyPr/>
-          <a:lstStyle/>
-          <a:p>
-            <a:endParaRPr lang="da-DK" dirty="0"/>
-          </a:p>
-        </p:txBody>
-      </p:sp>
       <p:pic>
         <p:nvPicPr>
           <p:cNvPr id="1026" name="Picture 2" descr="https://lh3.googleusercontent.com/VXfg8hLlbSnKnalYRRYuCAXbhLHYadubcn0SfuS1E1U_vJVD8j-4UWfcpXKGPGo7t5k_4GoBlaYP6nGvnt1Y-o8fdxRaEcVORwKlIZBMqDVNlRLgsIKX3yKJOw2xUCLp5jnGVoJo"/>
@@ -6127,7 +6261,7 @@
         </p:blipFill>
         <p:spPr bwMode="auto">
           <a:xfrm>
-            <a:off x="810000" y="2641923"/>
+            <a:off x="810000" y="3136687"/>
             <a:ext cx="5267179" cy="2344857"/>
           </a:xfrm>
           <a:prstGeom prst="rect">
@@ -6168,7 +6302,7 @@
         </p:blipFill>
         <p:spPr bwMode="auto">
           <a:xfrm>
-            <a:off x="6522415" y="2641923"/>
+            <a:off x="6522415" y="3136686"/>
             <a:ext cx="4850871" cy="2344857"/>
           </a:xfrm>
           <a:prstGeom prst="rect">
@@ -6186,6 +6320,122 @@
           </a:extLst>
         </p:spPr>
       </p:pic>
+      <p:sp>
+        <p:nvSpPr>
+          <p:cNvPr id="6" name="Right Arrow 5"/>
+          <p:cNvSpPr/>
+          <p:nvPr/>
+        </p:nvSpPr>
+        <p:spPr>
+          <a:xfrm>
+            <a:off x="5962046" y="4127881"/>
+            <a:ext cx="675503" cy="362465"/>
+          </a:xfrm>
+          <a:prstGeom prst="rightArrow">
+            <a:avLst/>
+          </a:prstGeom>
+        </p:spPr>
+        <p:style>
+          <a:lnRef idx="2">
+            <a:schemeClr val="accent1">
+              <a:shade val="50000"/>
+            </a:schemeClr>
+          </a:lnRef>
+          <a:fillRef idx="1">
+            <a:schemeClr val="accent1"/>
+          </a:fillRef>
+          <a:effectRef idx="0">
+            <a:schemeClr val="accent1"/>
+          </a:effectRef>
+          <a:fontRef idx="minor">
+            <a:schemeClr val="lt1"/>
+          </a:fontRef>
+        </p:style>
+        <p:txBody>
+          <a:bodyPr rtlCol="0" anchor="ctr"/>
+          <a:lstStyle/>
+          <a:p>
+            <a:pPr algn="ctr"/>
+            <a:endParaRPr lang="da-DK"/>
+          </a:p>
+        </p:txBody>
+      </p:sp>
+      <p:sp>
+        <p:nvSpPr>
+          <p:cNvPr id="4" name="TextBox 3"/>
+          <p:cNvSpPr txBox="1"/>
+          <p:nvPr/>
+        </p:nvSpPr>
+        <p:spPr>
+          <a:xfrm>
+            <a:off x="5531114" y="5112208"/>
+            <a:ext cx="505267" cy="369332"/>
+          </a:xfrm>
+          <a:prstGeom prst="rect">
+            <a:avLst/>
+          </a:prstGeom>
+          <a:noFill/>
+        </p:spPr>
+        <p:txBody>
+          <a:bodyPr wrap="none" rtlCol="0">
+            <a:spAutoFit/>
+          </a:bodyPr>
+          <a:lstStyle/>
+          <a:p>
+            <a:r>
+              <a:rPr lang="da-DK" dirty="0" smtClean="0">
+                <a:solidFill>
+                  <a:schemeClr val="bg1"/>
+                </a:solidFill>
+              </a:rPr>
+              <a:t>v.1</a:t>
+            </a:r>
+            <a:endParaRPr lang="da-DK" dirty="0">
+              <a:solidFill>
+                <a:schemeClr val="bg1"/>
+              </a:solidFill>
+            </a:endParaRPr>
+          </a:p>
+        </p:txBody>
+      </p:sp>
+      <p:sp>
+        <p:nvSpPr>
+          <p:cNvPr id="12" name="TextBox 11"/>
+          <p:cNvSpPr txBox="1"/>
+          <p:nvPr/>
+        </p:nvSpPr>
+        <p:spPr>
+          <a:xfrm>
+            <a:off x="6635872" y="5098954"/>
+            <a:ext cx="505267" cy="369332"/>
+          </a:xfrm>
+          <a:prstGeom prst="rect">
+            <a:avLst/>
+          </a:prstGeom>
+          <a:noFill/>
+        </p:spPr>
+        <p:txBody>
+          <a:bodyPr wrap="none" rtlCol="0">
+            <a:spAutoFit/>
+          </a:bodyPr>
+          <a:lstStyle/>
+          <a:p>
+            <a:r>
+              <a:rPr lang="da-DK" dirty="0" smtClean="0">
+                <a:solidFill>
+                  <a:schemeClr val="bg1"/>
+                </a:solidFill>
+              </a:rPr>
+              <a:t>v.3</a:t>
+            </a:r>
+            <a:endParaRPr lang="da-DK" dirty="0">
+              <a:solidFill>
+                <a:schemeClr val="bg1"/>
+              </a:solidFill>
+            </a:endParaRPr>
+          </a:p>
+        </p:txBody>
+      </p:sp>
     </p:spTree>
     <p:extLst>
       <p:ext uri="{BB962C8B-B14F-4D97-AF65-F5344CB8AC3E}">
@@ -6225,7 +6475,7 @@
       </p:grpSpPr>
       <p:sp>
         <p:nvSpPr>
-          <p:cNvPr id="2" name="Titel 1"/>
+          <p:cNvPr id="2" name="Title 1"/>
           <p:cNvSpPr>
             <a:spLocks noGrp="1"/>
           </p:cNvSpPr>
@@ -6240,19 +6490,14 @@
           <a:p>
             <a:r>
               <a:rPr lang="da-DK" dirty="0"/>
-              <a:t>Design </a:t>
-            </a:r>
-            <a:r>
-              <a:rPr lang="da-DK" dirty="0" smtClean="0"/>
-              <a:t>udvikling</a:t>
-            </a:r>
-            <a:endParaRPr lang="da-DK" dirty="0"/>
-          </a:p>
-        </p:txBody>
-      </p:sp>
-      <p:sp>
-        <p:nvSpPr>
-          <p:cNvPr id="3" name="Pladsholder til indhold 2"/>
+              <a:t>Design udvikling</a:t>
+            </a:r>
+          </a:p>
+        </p:txBody>
+      </p:sp>
+      <p:sp>
+        <p:nvSpPr>
+          <p:cNvPr id="3" name="Content Placeholder 2"/>
           <p:cNvSpPr>
             <a:spLocks noGrp="1"/>
           </p:cNvSpPr>
@@ -6265,75 +6510,322 @@
           <a:bodyPr/>
           <a:lstStyle/>
           <a:p>
-            <a:endParaRPr lang="da-DK" dirty="0"/>
+            <a:endParaRPr lang="da-DK"/>
           </a:p>
         </p:txBody>
       </p:sp>
       <p:pic>
         <p:nvPicPr>
-          <p:cNvPr id="5" name="Billede 4"/>
+          <p:cNvPr id="4" name="Picture 3" descr="https://lh5.googleusercontent.com/CohSM_9zMui4eNv0d7a5cRi1wbeY1fDkQ8bYO8_q-FCk-WX_DqEozuIp567IVYamZlsJemkEJ1gIXR-O6Cdst7brVFMq29QBVMFfZfXl1HVz1sDeQUDCXehIZJ6ieE_h8SEjqSXR"/>
+          <p:cNvPicPr/>
+          <p:nvPr/>
+        </p:nvPicPr>
+        <p:blipFill>
+          <a:blip r:embed="rId2">
+            <a:extLst>
+              <a:ext uri="{28A0092B-C50C-407E-A947-70E740481C1C}">
+                <a14:useLocalDpi xmlns:a14="http://schemas.microsoft.com/office/drawing/2010/main" val="0"/>
+              </a:ext>
+            </a:extLst>
+          </a:blip>
+          <a:srcRect/>
+          <a:stretch>
+            <a:fillRect/>
+          </a:stretch>
+        </p:blipFill>
+        <p:spPr bwMode="auto">
+          <a:xfrm>
+            <a:off x="4109118" y="3356065"/>
+            <a:ext cx="3406086" cy="1597561"/>
+          </a:xfrm>
+          <a:prstGeom prst="rect">
+            <a:avLst/>
+          </a:prstGeom>
+          <a:noFill/>
+          <a:ln>
+            <a:noFill/>
+          </a:ln>
+        </p:spPr>
+      </p:pic>
+      <p:pic>
+        <p:nvPicPr>
+          <p:cNvPr id="5" name="Content Placeholder 7" descr="https://lh6.googleusercontent.com/AcfGE1rdU_R0MKWVmj_5CUtuqAf9QG2NzJtPRcD_rlR5bJzknW3O8vyEK_Oov8Jhz6gGF0GdJBHDaKmnLTDJarvQYx3jo57-seO8kgGaF1GOMKqWl8UyDdFw7P6bdhL48LQ_wfQV"/>
           <p:cNvPicPr>
-            <a:picLocks noChangeAspect="1"/>
+            <a:picLocks/>
           </p:cNvPicPr>
           <p:nvPr/>
         </p:nvPicPr>
         <p:blipFill>
-          <a:blip r:embed="rId2"/>
+          <a:blip r:embed="rId3">
+            <a:extLst>
+              <a:ext uri="{28A0092B-C50C-407E-A947-70E740481C1C}">
+                <a14:useLocalDpi xmlns:a14="http://schemas.microsoft.com/office/drawing/2010/main" val="0"/>
+              </a:ext>
+            </a:extLst>
+          </a:blip>
+          <a:srcRect/>
           <a:stretch>
             <a:fillRect/>
           </a:stretch>
         </p:blipFill>
-        <p:spPr>
+        <p:spPr bwMode="auto">
           <a:xfrm>
-            <a:off x="2122846" y="2951671"/>
-            <a:ext cx="2760237" cy="1800796"/>
+            <a:off x="7801411" y="3326171"/>
+            <a:ext cx="3571875" cy="1657350"/>
           </a:xfrm>
           <a:prstGeom prst="rect">
             <a:avLst/>
           </a:prstGeom>
+          <a:noFill/>
+          <a:ln>
+            <a:noFill/>
+          </a:ln>
+          <a:effectLst>
+            <a:outerShdw blurRad="50800" dir="14400000">
+              <a:srgbClr val="000000">
+                <a:alpha val="40000"/>
+              </a:srgbClr>
+            </a:outerShdw>
+          </a:effectLst>
         </p:spPr>
       </p:pic>
+      <p:sp>
+        <p:nvSpPr>
+          <p:cNvPr id="6" name="Right Arrow 5"/>
+          <p:cNvSpPr/>
+          <p:nvPr/>
+        </p:nvSpPr>
+        <p:spPr>
+          <a:xfrm>
+            <a:off x="7320556" y="3826205"/>
+            <a:ext cx="675503" cy="362465"/>
+          </a:xfrm>
+          <a:prstGeom prst="rightArrow">
+            <a:avLst/>
+          </a:prstGeom>
+        </p:spPr>
+        <p:style>
+          <a:lnRef idx="2">
+            <a:schemeClr val="accent1">
+              <a:shade val="50000"/>
+            </a:schemeClr>
+          </a:lnRef>
+          <a:fillRef idx="1">
+            <a:schemeClr val="accent1"/>
+          </a:fillRef>
+          <a:effectRef idx="0">
+            <a:schemeClr val="accent1"/>
+          </a:effectRef>
+          <a:fontRef idx="minor">
+            <a:schemeClr val="lt1"/>
+          </a:fontRef>
+        </p:style>
+        <p:txBody>
+          <a:bodyPr rtlCol="0" anchor="ctr"/>
+          <a:lstStyle/>
+          <a:p>
+            <a:pPr algn="ctr"/>
+            <a:endParaRPr lang="da-DK"/>
+          </a:p>
+        </p:txBody>
+      </p:sp>
+      <p:sp>
+        <p:nvSpPr>
+          <p:cNvPr id="7" name="TextBox 6"/>
+          <p:cNvSpPr txBox="1"/>
+          <p:nvPr/>
+        </p:nvSpPr>
+        <p:spPr>
+          <a:xfrm>
+            <a:off x="4126701" y="4618245"/>
+            <a:ext cx="505267" cy="369332"/>
+          </a:xfrm>
+          <a:prstGeom prst="rect">
+            <a:avLst/>
+          </a:prstGeom>
+          <a:noFill/>
+        </p:spPr>
+        <p:txBody>
+          <a:bodyPr wrap="none" rtlCol="0">
+            <a:spAutoFit/>
+          </a:bodyPr>
+          <a:lstStyle/>
+          <a:p>
+            <a:r>
+              <a:rPr lang="da-DK" dirty="0" smtClean="0">
+                <a:solidFill>
+                  <a:schemeClr val="bg1"/>
+                </a:solidFill>
+              </a:rPr>
+              <a:t>v.2</a:t>
+            </a:r>
+            <a:endParaRPr lang="da-DK" dirty="0">
+              <a:solidFill>
+                <a:schemeClr val="bg1"/>
+              </a:solidFill>
+            </a:endParaRPr>
+          </a:p>
+        </p:txBody>
+      </p:sp>
+      <p:sp>
+        <p:nvSpPr>
+          <p:cNvPr id="8" name="TextBox 7"/>
+          <p:cNvSpPr txBox="1"/>
+          <p:nvPr/>
+        </p:nvSpPr>
+        <p:spPr>
+          <a:xfrm>
+            <a:off x="7801411" y="4614189"/>
+            <a:ext cx="505267" cy="369332"/>
+          </a:xfrm>
+          <a:prstGeom prst="rect">
+            <a:avLst/>
+          </a:prstGeom>
+          <a:noFill/>
+        </p:spPr>
+        <p:txBody>
+          <a:bodyPr wrap="none" rtlCol="0">
+            <a:spAutoFit/>
+          </a:bodyPr>
+          <a:lstStyle/>
+          <a:p>
+            <a:r>
+              <a:rPr lang="da-DK" dirty="0" smtClean="0">
+                <a:solidFill>
+                  <a:schemeClr val="bg1"/>
+                </a:solidFill>
+              </a:rPr>
+              <a:t>v.3</a:t>
+            </a:r>
+            <a:endParaRPr lang="da-DK" dirty="0">
+              <a:solidFill>
+                <a:schemeClr val="bg1"/>
+              </a:solidFill>
+            </a:endParaRPr>
+          </a:p>
+        </p:txBody>
+      </p:sp>
       <p:pic>
         <p:nvPicPr>
-          <p:cNvPr id="6" name="Billede 5"/>
-          <p:cNvPicPr>
-            <a:picLocks noChangeAspect="1"/>
-          </p:cNvPicPr>
+          <p:cNvPr id="9" name="Picture 8" descr="https://lh3.googleusercontent.com/lmTDdRxNXbWoLdZldBgUre5R8NHEV8SMYIhzpU-LdycUCmt_lI9NK1UGrcMFwfmoy1rFhAM-TxPsQ8j938_3OoNRvd2hoz2SCyUcUfJFPI14dB5o2oZv7MD63EaZsKRfQETav3vh"/>
+          <p:cNvPicPr/>
           <p:nvPr/>
         </p:nvPicPr>
         <p:blipFill>
-          <a:blip r:embed="rId3"/>
+          <a:blip r:embed="rId4">
+            <a:extLst>
+              <a:ext uri="{28A0092B-C50C-407E-A947-70E740481C1C}">
+                <a14:useLocalDpi xmlns:a14="http://schemas.microsoft.com/office/drawing/2010/main" val="0"/>
+              </a:ext>
+            </a:extLst>
+          </a:blip>
+          <a:srcRect/>
           <a:stretch>
             <a:fillRect/>
           </a:stretch>
         </p:blipFill>
-        <p:spPr>
+        <p:spPr bwMode="auto">
           <a:xfrm>
-            <a:off x="6833972" y="2951671"/>
-            <a:ext cx="2588424" cy="1799439"/>
+            <a:off x="810000" y="3326171"/>
+            <a:ext cx="3030494" cy="1603431"/>
           </a:xfrm>
           <a:prstGeom prst="rect">
             <a:avLst/>
           </a:prstGeom>
+          <a:noFill/>
+          <a:ln>
+            <a:noFill/>
+          </a:ln>
         </p:spPr>
       </p:pic>
+      <p:sp>
+        <p:nvSpPr>
+          <p:cNvPr id="10" name="Right Arrow 9"/>
+          <p:cNvSpPr/>
+          <p:nvPr/>
+        </p:nvSpPr>
+        <p:spPr>
+          <a:xfrm>
+            <a:off x="3637055" y="3826204"/>
+            <a:ext cx="675503" cy="362465"/>
+          </a:xfrm>
+          <a:prstGeom prst="rightArrow">
+            <a:avLst/>
+          </a:prstGeom>
+        </p:spPr>
+        <p:style>
+          <a:lnRef idx="2">
+            <a:schemeClr val="accent1">
+              <a:shade val="50000"/>
+            </a:schemeClr>
+          </a:lnRef>
+          <a:fillRef idx="1">
+            <a:schemeClr val="accent1"/>
+          </a:fillRef>
+          <a:effectRef idx="0">
+            <a:schemeClr val="accent1"/>
+          </a:effectRef>
+          <a:fontRef idx="minor">
+            <a:schemeClr val="lt1"/>
+          </a:fontRef>
+        </p:style>
+        <p:txBody>
+          <a:bodyPr rtlCol="0" anchor="ctr"/>
+          <a:lstStyle/>
+          <a:p>
+            <a:pPr algn="ctr"/>
+            <a:endParaRPr lang="da-DK"/>
+          </a:p>
+        </p:txBody>
+      </p:sp>
+      <p:sp>
+        <p:nvSpPr>
+          <p:cNvPr id="11" name="TextBox 10"/>
+          <p:cNvSpPr txBox="1"/>
+          <p:nvPr/>
+        </p:nvSpPr>
+        <p:spPr>
+          <a:xfrm>
+            <a:off x="748265" y="4584294"/>
+            <a:ext cx="505267" cy="369332"/>
+          </a:xfrm>
+          <a:prstGeom prst="rect">
+            <a:avLst/>
+          </a:prstGeom>
+          <a:noFill/>
+        </p:spPr>
+        <p:txBody>
+          <a:bodyPr wrap="none" rtlCol="0">
+            <a:spAutoFit/>
+          </a:bodyPr>
+          <a:lstStyle/>
+          <a:p>
+            <a:r>
+              <a:rPr lang="da-DK" dirty="0" smtClean="0">
+                <a:solidFill>
+                  <a:schemeClr val="bg1"/>
+                </a:solidFill>
+              </a:rPr>
+              <a:t>v.1</a:t>
+            </a:r>
+            <a:endParaRPr lang="da-DK" dirty="0">
+              <a:solidFill>
+                <a:schemeClr val="bg1"/>
+              </a:solidFill>
+            </a:endParaRPr>
+          </a:p>
+        </p:txBody>
+      </p:sp>
     </p:spTree>
     <p:extLst>
       <p:ext uri="{BB962C8B-B14F-4D97-AF65-F5344CB8AC3E}">
-        <p14:creationId xmlns:p14="http://schemas.microsoft.com/office/powerpoint/2010/main" val="530197261"/>
+        <p14:creationId xmlns:p14="http://schemas.microsoft.com/office/powerpoint/2010/main" val="996854043"/>
       </p:ext>
     </p:extLst>
   </p:cSld>
   <p:clrMapOvr>
     <a:masterClrMapping/>
   </p:clrMapOvr>
-  <p:timing>
-    <p:tnLst>
-      <p:par>
-        <p:cTn id="1" dur="indefinite" restart="never" nodeType="tmRoot"/>
-      </p:par>
-    </p:tnLst>
-  </p:timing>
 </p:sld>
 </file>
 
@@ -6370,8 +6862,12 @@
           <a:lstStyle/>
           <a:p>
             <a:r>
+              <a:rPr lang="da-DK" dirty="0"/>
+              <a:t>Design </a:t>
+            </a:r>
+            <a:r>
               <a:rPr lang="da-DK" dirty="0" smtClean="0"/>
-              <a:t>Resultater</a:t>
+              <a:t>udvikling</a:t>
             </a:r>
             <a:endParaRPr lang="da-DK" dirty="0"/>
           </a:p>
@@ -6392,50 +6888,280 @@
           <a:bodyPr/>
           <a:lstStyle/>
           <a:p>
-            <a:r>
-              <a:rPr lang="da-DK" dirty="0"/>
-              <a:t>25% færre væsentlige problemområder oplevet af ca. 50% færre testdeltagere</a:t>
-            </a:r>
-            <a:r>
-              <a:rPr lang="da-DK" dirty="0" smtClean="0"/>
-              <a:t>.</a:t>
-            </a:r>
-          </a:p>
-          <a:p>
-            <a:pPr lvl="1"/>
-            <a:r>
-              <a:rPr lang="da-DK" dirty="0" smtClean="0"/>
-              <a:t>2-4 testdeltagere til 1-2 testdeltagere</a:t>
-            </a:r>
             <a:endParaRPr lang="da-DK" dirty="0"/>
           </a:p>
-          <a:p>
-            <a:r>
-              <a:rPr lang="da-DK" dirty="0" smtClean="0"/>
-              <a:t>Alle </a:t>
-            </a:r>
-            <a:r>
-              <a:rPr lang="da-DK" dirty="0" err="1" smtClean="0"/>
-              <a:t>testopgaver</a:t>
-            </a:r>
-            <a:r>
-              <a:rPr lang="da-DK" dirty="0" smtClean="0"/>
-              <a:t> overholdte de målelige krav i anden test</a:t>
-            </a:r>
-          </a:p>
-          <a:p>
-            <a:r>
-              <a:rPr lang="da-DK" dirty="0" smtClean="0"/>
-              <a:t>Usability test er løsningen</a:t>
-            </a:r>
-            <a:endParaRPr lang="da-DK" dirty="0"/>
+        </p:txBody>
+      </p:sp>
+      <p:pic>
+        <p:nvPicPr>
+          <p:cNvPr id="4" name="Picture 3"/>
+          <p:cNvPicPr>
+            <a:picLocks noChangeAspect="1"/>
+          </p:cNvPicPr>
+          <p:nvPr/>
+        </p:nvPicPr>
+        <p:blipFill>
+          <a:blip r:embed="rId2"/>
+          <a:stretch>
+            <a:fillRect/>
+          </a:stretch>
+        </p:blipFill>
+        <p:spPr>
+          <a:xfrm>
+            <a:off x="4684627" y="3133555"/>
+            <a:ext cx="2669622" cy="1672668"/>
+          </a:xfrm>
+          <a:prstGeom prst="rect">
+            <a:avLst/>
+          </a:prstGeom>
+        </p:spPr>
+      </p:pic>
+      <p:pic>
+        <p:nvPicPr>
+          <p:cNvPr id="7" name="Picture 6"/>
+          <p:cNvPicPr>
+            <a:picLocks noChangeAspect="1"/>
+          </p:cNvPicPr>
+          <p:nvPr/>
+        </p:nvPicPr>
+        <p:blipFill>
+          <a:blip r:embed="rId3"/>
+          <a:stretch>
+            <a:fillRect/>
+          </a:stretch>
+        </p:blipFill>
+        <p:spPr>
+          <a:xfrm>
+            <a:off x="1026554" y="3137556"/>
+            <a:ext cx="2645613" cy="1692744"/>
+          </a:xfrm>
+          <a:prstGeom prst="rect">
+            <a:avLst/>
+          </a:prstGeom>
+        </p:spPr>
+      </p:pic>
+      <p:pic>
+        <p:nvPicPr>
+          <p:cNvPr id="8" name="Picture 7"/>
+          <p:cNvPicPr>
+            <a:picLocks noChangeAspect="1"/>
+          </p:cNvPicPr>
+          <p:nvPr/>
+        </p:nvPicPr>
+        <p:blipFill>
+          <a:blip r:embed="rId4"/>
+          <a:stretch>
+            <a:fillRect/>
+          </a:stretch>
+        </p:blipFill>
+        <p:spPr>
+          <a:xfrm>
+            <a:off x="8261553" y="3133555"/>
+            <a:ext cx="2669622" cy="1813974"/>
+          </a:xfrm>
+          <a:prstGeom prst="rect">
+            <a:avLst/>
+          </a:prstGeom>
+        </p:spPr>
+      </p:pic>
+      <p:sp>
+        <p:nvSpPr>
+          <p:cNvPr id="9" name="Right Arrow 8"/>
+          <p:cNvSpPr/>
+          <p:nvPr/>
+        </p:nvSpPr>
+        <p:spPr>
+          <a:xfrm>
+            <a:off x="3845335" y="3788656"/>
+            <a:ext cx="675503" cy="362465"/>
+          </a:xfrm>
+          <a:prstGeom prst="rightArrow">
+            <a:avLst/>
+          </a:prstGeom>
+        </p:spPr>
+        <p:style>
+          <a:lnRef idx="2">
+            <a:schemeClr val="accent1">
+              <a:shade val="50000"/>
+            </a:schemeClr>
+          </a:lnRef>
+          <a:fillRef idx="1">
+            <a:schemeClr val="accent1"/>
+          </a:fillRef>
+          <a:effectRef idx="0">
+            <a:schemeClr val="accent1"/>
+          </a:effectRef>
+          <a:fontRef idx="minor">
+            <a:schemeClr val="lt1"/>
+          </a:fontRef>
+        </p:style>
+        <p:txBody>
+          <a:bodyPr rtlCol="0" anchor="ctr"/>
+          <a:lstStyle/>
+          <a:p>
+            <a:pPr algn="ctr"/>
+            <a:endParaRPr lang="da-DK"/>
+          </a:p>
+        </p:txBody>
+      </p:sp>
+      <p:sp>
+        <p:nvSpPr>
+          <p:cNvPr id="10" name="Right Arrow 9"/>
+          <p:cNvSpPr/>
+          <p:nvPr/>
+        </p:nvSpPr>
+        <p:spPr>
+          <a:xfrm>
+            <a:off x="7445211" y="3788655"/>
+            <a:ext cx="675503" cy="362465"/>
+          </a:xfrm>
+          <a:prstGeom prst="rightArrow">
+            <a:avLst/>
+          </a:prstGeom>
+        </p:spPr>
+        <p:style>
+          <a:lnRef idx="2">
+            <a:schemeClr val="accent1">
+              <a:shade val="50000"/>
+            </a:schemeClr>
+          </a:lnRef>
+          <a:fillRef idx="1">
+            <a:schemeClr val="accent1"/>
+          </a:fillRef>
+          <a:effectRef idx="0">
+            <a:schemeClr val="accent1"/>
+          </a:effectRef>
+          <a:fontRef idx="minor">
+            <a:schemeClr val="lt1"/>
+          </a:fontRef>
+        </p:style>
+        <p:txBody>
+          <a:bodyPr rtlCol="0" anchor="ctr"/>
+          <a:lstStyle/>
+          <a:p>
+            <a:pPr algn="ctr"/>
+            <a:endParaRPr lang="da-DK"/>
+          </a:p>
+        </p:txBody>
+      </p:sp>
+      <p:sp>
+        <p:nvSpPr>
+          <p:cNvPr id="11" name="TextBox 10"/>
+          <p:cNvSpPr txBox="1"/>
+          <p:nvPr/>
+        </p:nvSpPr>
+        <p:spPr>
+          <a:xfrm>
+            <a:off x="1026554" y="4456967"/>
+            <a:ext cx="505267" cy="369332"/>
+          </a:xfrm>
+          <a:prstGeom prst="rect">
+            <a:avLst/>
+          </a:prstGeom>
+          <a:noFill/>
+        </p:spPr>
+        <p:txBody>
+          <a:bodyPr wrap="none" rtlCol="0">
+            <a:spAutoFit/>
+          </a:bodyPr>
+          <a:lstStyle/>
+          <a:p>
+            <a:r>
+              <a:rPr lang="da-DK" dirty="0" smtClean="0">
+                <a:solidFill>
+                  <a:schemeClr val="bg1"/>
+                </a:solidFill>
+              </a:rPr>
+              <a:t>v.1</a:t>
+            </a:r>
+            <a:endParaRPr lang="da-DK" dirty="0">
+              <a:solidFill>
+                <a:schemeClr val="bg1"/>
+              </a:solidFill>
+            </a:endParaRPr>
+          </a:p>
+        </p:txBody>
+      </p:sp>
+      <p:sp>
+        <p:nvSpPr>
+          <p:cNvPr id="12" name="TextBox 11"/>
+          <p:cNvSpPr txBox="1"/>
+          <p:nvPr/>
+        </p:nvSpPr>
+        <p:spPr>
+          <a:xfrm>
+            <a:off x="4684627" y="4456967"/>
+            <a:ext cx="505267" cy="369332"/>
+          </a:xfrm>
+          <a:prstGeom prst="rect">
+            <a:avLst/>
+          </a:prstGeom>
+          <a:noFill/>
+        </p:spPr>
+        <p:txBody>
+          <a:bodyPr wrap="none" rtlCol="0">
+            <a:spAutoFit/>
+          </a:bodyPr>
+          <a:lstStyle/>
+          <a:p>
+            <a:r>
+              <a:rPr lang="da-DK" dirty="0" smtClean="0">
+                <a:solidFill>
+                  <a:schemeClr val="bg1"/>
+                </a:solidFill>
+              </a:rPr>
+              <a:t>v.2</a:t>
+            </a:r>
+            <a:endParaRPr lang="da-DK" dirty="0">
+              <a:solidFill>
+                <a:schemeClr val="bg1"/>
+              </a:solidFill>
+            </a:endParaRPr>
+          </a:p>
+        </p:txBody>
+      </p:sp>
+      <p:sp>
+        <p:nvSpPr>
+          <p:cNvPr id="15" name="TextBox 14"/>
+          <p:cNvSpPr txBox="1"/>
+          <p:nvPr/>
+        </p:nvSpPr>
+        <p:spPr>
+          <a:xfrm>
+            <a:off x="8261553" y="4578197"/>
+            <a:ext cx="505267" cy="369332"/>
+          </a:xfrm>
+          <a:prstGeom prst="rect">
+            <a:avLst/>
+          </a:prstGeom>
+          <a:noFill/>
+        </p:spPr>
+        <p:txBody>
+          <a:bodyPr wrap="none" rtlCol="0">
+            <a:spAutoFit/>
+          </a:bodyPr>
+          <a:lstStyle/>
+          <a:p>
+            <a:r>
+              <a:rPr lang="da-DK" dirty="0" smtClean="0">
+                <a:solidFill>
+                  <a:schemeClr val="bg1"/>
+                </a:solidFill>
+              </a:rPr>
+              <a:t>v.3</a:t>
+            </a:r>
+            <a:endParaRPr lang="da-DK" dirty="0">
+              <a:solidFill>
+                <a:schemeClr val="bg1"/>
+              </a:solidFill>
+            </a:endParaRPr>
           </a:p>
         </p:txBody>
       </p:sp>
     </p:spTree>
     <p:extLst>
       <p:ext uri="{BB962C8B-B14F-4D97-AF65-F5344CB8AC3E}">
-        <p14:creationId xmlns:p14="http://schemas.microsoft.com/office/powerpoint/2010/main" val="2468383937"/>
+        <p14:creationId xmlns:p14="http://schemas.microsoft.com/office/powerpoint/2010/main" val="530197261"/>
       </p:ext>
     </p:extLst>
   </p:cSld>
@@ -6485,8 +7211,8 @@
           <a:lstStyle/>
           <a:p>
             <a:r>
-              <a:rPr lang="da-DK" dirty="0" err="1" smtClean="0"/>
-              <a:t>Reflektion</a:t>
+              <a:rPr lang="da-DK" dirty="0" smtClean="0"/>
+              <a:t>Resultater</a:t>
             </a:r>
             <a:endParaRPr lang="da-DK" dirty="0"/>
           </a:p>
@@ -6504,77 +7230,37 @@
         </p:nvSpPr>
         <p:spPr/>
         <p:txBody>
-          <a:bodyPr>
-            <a:normAutofit/>
-          </a:bodyPr>
-          <a:lstStyle/>
-          <a:p>
+          <a:bodyPr/>
+          <a:lstStyle/>
+          <a:p>
+            <a:r>
+              <a:rPr lang="da-DK" dirty="0"/>
+              <a:t>25% færre væsentlige problemområder oplevet af ca. 50% færre testdeltagere</a:t>
+            </a:r>
             <a:r>
               <a:rPr lang="da-DK" dirty="0" smtClean="0"/>
-              <a:t>Usability test</a:t>
+              <a:t>.</a:t>
             </a:r>
           </a:p>
           <a:p>
             <a:pPr lvl="1"/>
             <a:r>
               <a:rPr lang="da-DK" dirty="0" smtClean="0"/>
-              <a:t>Bruger feedback</a:t>
-            </a:r>
-          </a:p>
-          <a:p>
-            <a:r>
-              <a:rPr lang="da-DK" dirty="0"/>
-              <a:t>Test af eget </a:t>
-            </a:r>
+              <a:t>2-4 testdeltagere til 1-2 testdeltagere</a:t>
+            </a:r>
+            <a:endParaRPr lang="da-DK" dirty="0"/>
+          </a:p>
+          <a:p>
             <a:r>
               <a:rPr lang="da-DK" dirty="0" smtClean="0"/>
-              <a:t>produkt</a:t>
-            </a:r>
-          </a:p>
-          <a:p>
-            <a:pPr lvl="1"/>
+              <a:t>Alle testopgaver overholder de målelige krav i anden test</a:t>
+            </a:r>
+          </a:p>
+          <a:p>
             <a:r>
               <a:rPr lang="da-DK" dirty="0" smtClean="0"/>
-              <a:t>Drejebogen</a:t>
-            </a:r>
-          </a:p>
-          <a:p>
-            <a:pPr lvl="1"/>
-            <a:r>
-              <a:rPr lang="da-DK" dirty="0" smtClean="0"/>
-              <a:t>Brugerkontakt</a:t>
-            </a:r>
-          </a:p>
-          <a:p>
-            <a:r>
-              <a:rPr lang="da-DK" dirty="0" smtClean="0"/>
-              <a:t>Ingen </a:t>
-            </a:r>
-            <a:r>
-              <a:rPr lang="da-DK" dirty="0"/>
-              <a:t>tidlig </a:t>
-            </a:r>
-            <a:r>
-              <a:rPr lang="da-DK" dirty="0" smtClean="0"/>
-              <a:t>brugerinddragelse</a:t>
-            </a:r>
-          </a:p>
-          <a:p>
-            <a:pPr lvl="1"/>
-            <a:r>
-              <a:rPr lang="da-DK" dirty="0" smtClean="0"/>
-              <a:t>Skitser</a:t>
-            </a:r>
-            <a:r>
-              <a:rPr lang="da-DK" dirty="0"/>
-              <a:t> </a:t>
-            </a:r>
-            <a:r>
-              <a:rPr lang="da-DK" dirty="0" smtClean="0"/>
-              <a:t>og spørgeskemaundersøgelser</a:t>
-            </a:r>
-          </a:p>
-          <a:p>
+              <a:t>Usability test er løsningen</a:t>
+            </a:r>
             <a:endParaRPr lang="da-DK" dirty="0"/>
           </a:p>
         </p:txBody>
@@ -6582,7 +7268,7 @@
     </p:spTree>
     <p:extLst>
       <p:ext uri="{BB962C8B-B14F-4D97-AF65-F5344CB8AC3E}">
-        <p14:creationId xmlns:p14="http://schemas.microsoft.com/office/powerpoint/2010/main" val="4136545028"/>
+        <p14:creationId xmlns:p14="http://schemas.microsoft.com/office/powerpoint/2010/main" val="2468383937"/>
       </p:ext>
     </p:extLst>
   </p:cSld>

</xml_diff>